<commit_message>
lite update resize mode
</commit_message>
<xml_diff>
--- a/textures_original/source/xBonus.pptx
+++ b/textures_original/source/xBonus.pptx
@@ -6,6 +6,7 @@
   </p:sldMasterIdLst>
   <p:sldIdLst>
     <p:sldId id="256" r:id="rId2"/>
+    <p:sldId id="257" r:id="rId3"/>
   </p:sldIdLst>
   <p:sldSz cx="12192000" cy="6858000"/>
   <p:notesSz cx="6858000" cy="9144000"/>
@@ -104,6 +105,11 @@
       </a:defRPr>
     </a:lvl9pPr>
   </p:defaultTextStyle>
+  <p:extLst>
+    <p:ext uri="{EFAFB233-063F-42B5-8137-9DF3F51BA10A}">
+      <p15:sldGuideLst xmlns:p15="http://schemas.microsoft.com/office/powerpoint/2012/main"/>
+    </p:ext>
+  </p:extLst>
 </p:presentation>
 </file>
 
@@ -256,7 +262,7 @@
           <a:p>
             <a:fld id="{BF3EFD9A-3552-4A13-9BE4-223C10E91602}" type="datetimeFigureOut">
               <a:rPr lang="en-US" smtClean="0"/>
-              <a:t>10/18/2023</a:t>
+              <a:t>10/19/2023</a:t>
             </a:fld>
             <a:endParaRPr lang="en-US"/>
           </a:p>
@@ -456,7 +462,7 @@
           <a:p>
             <a:fld id="{BF3EFD9A-3552-4A13-9BE4-223C10E91602}" type="datetimeFigureOut">
               <a:rPr lang="en-US" smtClean="0"/>
-              <a:t>10/18/2023</a:t>
+              <a:t>10/19/2023</a:t>
             </a:fld>
             <a:endParaRPr lang="en-US"/>
           </a:p>
@@ -666,7 +672,7 @@
           <a:p>
             <a:fld id="{BF3EFD9A-3552-4A13-9BE4-223C10E91602}" type="datetimeFigureOut">
               <a:rPr lang="en-US" smtClean="0"/>
-              <a:t>10/18/2023</a:t>
+              <a:t>10/19/2023</a:t>
             </a:fld>
             <a:endParaRPr lang="en-US"/>
           </a:p>
@@ -866,7 +872,7 @@
           <a:p>
             <a:fld id="{BF3EFD9A-3552-4A13-9BE4-223C10E91602}" type="datetimeFigureOut">
               <a:rPr lang="en-US" smtClean="0"/>
-              <a:t>10/18/2023</a:t>
+              <a:t>10/19/2023</a:t>
             </a:fld>
             <a:endParaRPr lang="en-US"/>
           </a:p>
@@ -1142,7 +1148,7 @@
           <a:p>
             <a:fld id="{BF3EFD9A-3552-4A13-9BE4-223C10E91602}" type="datetimeFigureOut">
               <a:rPr lang="en-US" smtClean="0"/>
-              <a:t>10/18/2023</a:t>
+              <a:t>10/19/2023</a:t>
             </a:fld>
             <a:endParaRPr lang="en-US"/>
           </a:p>
@@ -1410,7 +1416,7 @@
           <a:p>
             <a:fld id="{BF3EFD9A-3552-4A13-9BE4-223C10E91602}" type="datetimeFigureOut">
               <a:rPr lang="en-US" smtClean="0"/>
-              <a:t>10/18/2023</a:t>
+              <a:t>10/19/2023</a:t>
             </a:fld>
             <a:endParaRPr lang="en-US"/>
           </a:p>
@@ -1825,7 +1831,7 @@
           <a:p>
             <a:fld id="{BF3EFD9A-3552-4A13-9BE4-223C10E91602}" type="datetimeFigureOut">
               <a:rPr lang="en-US" smtClean="0"/>
-              <a:t>10/18/2023</a:t>
+              <a:t>10/19/2023</a:t>
             </a:fld>
             <a:endParaRPr lang="en-US"/>
           </a:p>
@@ -1967,7 +1973,7 @@
           <a:p>
             <a:fld id="{BF3EFD9A-3552-4A13-9BE4-223C10E91602}" type="datetimeFigureOut">
               <a:rPr lang="en-US" smtClean="0"/>
-              <a:t>10/18/2023</a:t>
+              <a:t>10/19/2023</a:t>
             </a:fld>
             <a:endParaRPr lang="en-US"/>
           </a:p>
@@ -2080,7 +2086,7 @@
           <a:p>
             <a:fld id="{BF3EFD9A-3552-4A13-9BE4-223C10E91602}" type="datetimeFigureOut">
               <a:rPr lang="en-US" smtClean="0"/>
-              <a:t>10/18/2023</a:t>
+              <a:t>10/19/2023</a:t>
             </a:fld>
             <a:endParaRPr lang="en-US"/>
           </a:p>
@@ -2393,7 +2399,7 @@
           <a:p>
             <a:fld id="{BF3EFD9A-3552-4A13-9BE4-223C10E91602}" type="datetimeFigureOut">
               <a:rPr lang="en-US" smtClean="0"/>
-              <a:t>10/18/2023</a:t>
+              <a:t>10/19/2023</a:t>
             </a:fld>
             <a:endParaRPr lang="en-US"/>
           </a:p>
@@ -2682,7 +2688,7 @@
           <a:p>
             <a:fld id="{BF3EFD9A-3552-4A13-9BE4-223C10E91602}" type="datetimeFigureOut">
               <a:rPr lang="en-US" smtClean="0"/>
-              <a:t>10/18/2023</a:t>
+              <a:t>10/19/2023</a:t>
             </a:fld>
             <a:endParaRPr lang="en-US"/>
           </a:p>
@@ -2925,7 +2931,7 @@
           <a:p>
             <a:fld id="{BF3EFD9A-3552-4A13-9BE4-223C10E91602}" type="datetimeFigureOut">
               <a:rPr lang="en-US" smtClean="0"/>
-              <a:t>10/18/2023</a:t>
+              <a:t>10/19/2023</a:t>
             </a:fld>
             <a:endParaRPr lang="en-US"/>
           </a:p>
@@ -3607,6 +3613,576 @@
 </p:sld>
 </file>
 
+<file path=ppt/slides/slide2.xml><?xml version="1.0" encoding="utf-8"?>
+<p:sld xmlns:a="http://schemas.openxmlformats.org/drawingml/2006/main" xmlns:r="http://schemas.openxmlformats.org/officeDocument/2006/relationships" xmlns:p="http://schemas.openxmlformats.org/presentationml/2006/main">
+  <p:cSld>
+    <p:spTree>
+      <p:nvGrpSpPr>
+        <p:cNvPr id="1" name=""/>
+        <p:cNvGrpSpPr/>
+        <p:nvPr/>
+      </p:nvGrpSpPr>
+      <p:grpSpPr>
+        <a:xfrm>
+          <a:off x="0" y="0"/>
+          <a:ext cx="0" cy="0"/>
+          <a:chOff x="0" y="0"/>
+          <a:chExt cx="0" cy="0"/>
+        </a:xfrm>
+      </p:grpSpPr>
+      <p:grpSp>
+        <p:nvGrpSpPr>
+          <p:cNvPr id="15" name="Группа 14">
+            <a:extLst>
+              <a:ext uri="{FF2B5EF4-FFF2-40B4-BE49-F238E27FC236}">
+                <a16:creationId xmlns:a16="http://schemas.microsoft.com/office/drawing/2014/main" id="{6929FFE3-AD77-0ED7-4078-FECBDF237A03}"/>
+              </a:ext>
+            </a:extLst>
+          </p:cNvPr>
+          <p:cNvGrpSpPr/>
+          <p:nvPr/>
+        </p:nvGrpSpPr>
+        <p:grpSpPr>
+          <a:xfrm>
+            <a:off x="0" y="1390"/>
+            <a:ext cx="12192000" cy="6855220"/>
+            <a:chOff x="0" y="1390"/>
+            <a:chExt cx="12192000" cy="6855220"/>
+          </a:xfrm>
+        </p:grpSpPr>
+        <p:pic>
+          <p:nvPicPr>
+            <p:cNvPr id="7" name="Рисунок 6">
+              <a:extLst>
+                <a:ext uri="{FF2B5EF4-FFF2-40B4-BE49-F238E27FC236}">
+                  <a16:creationId xmlns:a16="http://schemas.microsoft.com/office/drawing/2014/main" id="{A27A1B76-7264-C871-7284-CE18805DD0CF}"/>
+                </a:ext>
+              </a:extLst>
+            </p:cNvPr>
+            <p:cNvPicPr>
+              <a:picLocks noChangeAspect="1"/>
+            </p:cNvPicPr>
+            <p:nvPr/>
+          </p:nvPicPr>
+          <p:blipFill>
+            <a:blip r:embed="rId2"/>
+            <a:stretch>
+              <a:fillRect/>
+            </a:stretch>
+          </p:blipFill>
+          <p:spPr>
+            <a:xfrm>
+              <a:off x="0" y="1390"/>
+              <a:ext cx="12192000" cy="6855220"/>
+            </a:xfrm>
+            <a:prstGeom prst="rect">
+              <a:avLst/>
+            </a:prstGeom>
+          </p:spPr>
+        </p:pic>
+        <p:sp>
+          <p:nvSpPr>
+            <p:cNvPr id="8" name="TextBox 7">
+              <a:extLst>
+                <a:ext uri="{FF2B5EF4-FFF2-40B4-BE49-F238E27FC236}">
+                  <a16:creationId xmlns:a16="http://schemas.microsoft.com/office/drawing/2014/main" id="{F691865D-4CA7-AC0F-E4AA-6FF8C18A5812}"/>
+                </a:ext>
+              </a:extLst>
+            </p:cNvPr>
+            <p:cNvSpPr txBox="1"/>
+            <p:nvPr/>
+          </p:nvSpPr>
+          <p:spPr>
+            <a:xfrm>
+              <a:off x="62959" y="5955860"/>
+              <a:ext cx="4733347" cy="369332"/>
+            </a:xfrm>
+            <a:prstGeom prst="rect">
+              <a:avLst/>
+            </a:prstGeom>
+            <a:noFill/>
+            <a:ln>
+              <a:solidFill>
+                <a:srgbClr val="0000CC"/>
+              </a:solidFill>
+            </a:ln>
+          </p:spPr>
+          <p:txBody>
+            <a:bodyPr wrap="none" rtlCol="0">
+              <a:spAutoFit/>
+            </a:bodyPr>
+            <a:lstStyle/>
+            <a:p>
+              <a:r>
+                <a:rPr lang="en-US" dirty="0">
+                  <a:solidFill>
+                    <a:srgbClr val="0000CC"/>
+                  </a:solidFill>
+                </a:rPr>
+                <a:t>Your ally health, don't let the enemies reach him</a:t>
+              </a:r>
+            </a:p>
+          </p:txBody>
+        </p:sp>
+        <p:sp>
+          <p:nvSpPr>
+            <p:cNvPr id="9" name="TextBox 8">
+              <a:extLst>
+                <a:ext uri="{FF2B5EF4-FFF2-40B4-BE49-F238E27FC236}">
+                  <a16:creationId xmlns:a16="http://schemas.microsoft.com/office/drawing/2014/main" id="{D562942B-0D86-2451-20C8-DA0B8F4C524B}"/>
+                </a:ext>
+              </a:extLst>
+            </p:cNvPr>
+            <p:cNvSpPr txBox="1"/>
+            <p:nvPr/>
+          </p:nvSpPr>
+          <p:spPr>
+            <a:xfrm>
+              <a:off x="62959" y="529174"/>
+              <a:ext cx="1255857" cy="369332"/>
+            </a:xfrm>
+            <a:prstGeom prst="rect">
+              <a:avLst/>
+            </a:prstGeom>
+            <a:noFill/>
+            <a:ln>
+              <a:solidFill>
+                <a:srgbClr val="CC0000"/>
+              </a:solidFill>
+            </a:ln>
+          </p:spPr>
+          <p:txBody>
+            <a:bodyPr wrap="none" rtlCol="0">
+              <a:spAutoFit/>
+            </a:bodyPr>
+            <a:lstStyle/>
+            <a:p>
+              <a:r>
+                <a:rPr lang="en-US" dirty="0">
+                  <a:solidFill>
+                    <a:srgbClr val="CC0000"/>
+                  </a:solidFill>
+                </a:rPr>
+                <a:t>Your health</a:t>
+              </a:r>
+            </a:p>
+          </p:txBody>
+        </p:sp>
+        <p:sp>
+          <p:nvSpPr>
+            <p:cNvPr id="10" name="TextBox 9">
+              <a:extLst>
+                <a:ext uri="{FF2B5EF4-FFF2-40B4-BE49-F238E27FC236}">
+                  <a16:creationId xmlns:a16="http://schemas.microsoft.com/office/drawing/2014/main" id="{F6939096-2325-882D-4DA8-35F421DC561B}"/>
+                </a:ext>
+              </a:extLst>
+            </p:cNvPr>
+            <p:cNvSpPr txBox="1"/>
+            <p:nvPr/>
+          </p:nvSpPr>
+          <p:spPr>
+            <a:xfrm>
+              <a:off x="3830503" y="56810"/>
+              <a:ext cx="1898212" cy="369332"/>
+            </a:xfrm>
+            <a:prstGeom prst="rect">
+              <a:avLst/>
+            </a:prstGeom>
+            <a:noFill/>
+            <a:ln>
+              <a:solidFill>
+                <a:srgbClr val="C05AC2"/>
+              </a:solidFill>
+            </a:ln>
+          </p:spPr>
+          <p:txBody>
+            <a:bodyPr wrap="none" rtlCol="0">
+              <a:spAutoFit/>
+            </a:bodyPr>
+            <a:lstStyle/>
+            <a:p>
+              <a:r>
+                <a:rPr lang="en-US" dirty="0">
+                  <a:solidFill>
+                    <a:srgbClr val="C05AC2"/>
+                  </a:solidFill>
+                </a:rPr>
+                <a:t>Your current score</a:t>
+              </a:r>
+            </a:p>
+          </p:txBody>
+        </p:sp>
+        <p:sp>
+          <p:nvSpPr>
+            <p:cNvPr id="11" name="TextBox 10">
+              <a:extLst>
+                <a:ext uri="{FF2B5EF4-FFF2-40B4-BE49-F238E27FC236}">
+                  <a16:creationId xmlns:a16="http://schemas.microsoft.com/office/drawing/2014/main" id="{A7C38923-4E17-C4BE-0A83-0D8613A94F7B}"/>
+                </a:ext>
+              </a:extLst>
+            </p:cNvPr>
+            <p:cNvSpPr txBox="1"/>
+            <p:nvPr/>
+          </p:nvSpPr>
+          <p:spPr>
+            <a:xfrm>
+              <a:off x="2932693" y="481561"/>
+              <a:ext cx="2796022" cy="369332"/>
+            </a:xfrm>
+            <a:prstGeom prst="rect">
+              <a:avLst/>
+            </a:prstGeom>
+            <a:noFill/>
+            <a:ln>
+              <a:solidFill>
+                <a:srgbClr val="F8B6FA"/>
+              </a:solidFill>
+            </a:ln>
+          </p:spPr>
+          <p:txBody>
+            <a:bodyPr wrap="none" rtlCol="0">
+              <a:spAutoFit/>
+            </a:bodyPr>
+            <a:lstStyle/>
+            <a:p>
+              <a:r>
+                <a:rPr lang="en-US" dirty="0">
+                  <a:solidFill>
+                    <a:srgbClr val="F8B6FA"/>
+                  </a:solidFill>
+                </a:rPr>
+                <a:t>Your current multiply bonus</a:t>
+              </a:r>
+            </a:p>
+          </p:txBody>
+        </p:sp>
+        <mc:AlternateContent xmlns:mc="http://schemas.openxmlformats.org/markup-compatibility/2006">
+          <mc:Choice xmlns:a14="http://schemas.microsoft.com/office/drawing/2010/main" Requires="a14">
+            <p:sp>
+              <p:nvSpPr>
+                <p:cNvPr id="12" name="TextBox 11">
+                  <a:extLst>
+                    <a:ext uri="{FF2B5EF4-FFF2-40B4-BE49-F238E27FC236}">
+                      <a16:creationId xmlns:a16="http://schemas.microsoft.com/office/drawing/2014/main" id="{994560BB-64A6-4BDF-483E-3B4BF2D7B02B}"/>
+                    </a:ext>
+                  </a:extLst>
+                </p:cNvPr>
+                <p:cNvSpPr txBox="1"/>
+                <p:nvPr/>
+              </p:nvSpPr>
+              <p:spPr>
+                <a:xfrm>
+                  <a:off x="62959" y="1868592"/>
+                  <a:ext cx="3486275" cy="3970318"/>
+                </a:xfrm>
+                <a:prstGeom prst="rect">
+                  <a:avLst/>
+                </a:prstGeom>
+                <a:noFill/>
+                <a:ln>
+                  <a:solidFill>
+                    <a:schemeClr val="bg1"/>
+                  </a:solidFill>
+                </a:ln>
+              </p:spPr>
+              <p:txBody>
+                <a:bodyPr wrap="none" rtlCol="0">
+                  <a:spAutoFit/>
+                </a:bodyPr>
+                <a:lstStyle/>
+                <a:p>
+                  <a:r>
+                    <a:rPr lang="en-US" b="1" dirty="0">
+                      <a:solidFill>
+                        <a:schemeClr val="bg1"/>
+                      </a:solidFill>
+                    </a:rPr>
+                    <a:t>If you play by PC:</a:t>
+                  </a:r>
+                </a:p>
+                <a:p>
+                  <a:endParaRPr lang="en-US" dirty="0">
+                    <a:solidFill>
+                      <a:schemeClr val="bg1"/>
+                    </a:solidFill>
+                  </a:endParaRPr>
+                </a:p>
+                <a:p>
+                  <a:r>
+                    <a:rPr lang="en-US" dirty="0">
+                      <a:solidFill>
+                        <a:schemeClr val="bg1"/>
+                      </a:solidFill>
+                    </a:rPr>
+                    <a:t>use </a:t>
+                  </a:r>
+                  <a14:m>
+                    <m:oMath xmlns:m="http://schemas.openxmlformats.org/officeDocument/2006/math">
+                      <m:r>
+                        <a:rPr lang="en-US" i="1" smtClean="0">
+                          <a:solidFill>
+                            <a:schemeClr val="bg1"/>
+                          </a:solidFill>
+                          <a:latin typeface="Cambria Math" panose="02040503050406030204" pitchFamily="18" charset="0"/>
+                          <a:ea typeface="Cambria Math" panose="02040503050406030204" pitchFamily="18" charset="0"/>
+                        </a:rPr>
+                        <m:t>←↑→↓</m:t>
+                      </m:r>
+                    </m:oMath>
+                  </a14:m>
+                  <a:r>
+                    <a:rPr lang="en-US" dirty="0">
+                      <a:solidFill>
+                        <a:schemeClr val="bg1"/>
+                      </a:solidFill>
+                    </a:rPr>
+                    <a:t> for moving</a:t>
+                  </a:r>
+                </a:p>
+                <a:p>
+                  <a:r>
+                    <a:rPr lang="en-US" dirty="0">
+                      <a:solidFill>
+                        <a:schemeClr val="bg1"/>
+                      </a:solidFill>
+                    </a:rPr>
+                    <a:t>use SPACE for shooting</a:t>
+                  </a:r>
+                </a:p>
+                <a:p>
+                  <a:endParaRPr lang="en-US" dirty="0">
+                    <a:solidFill>
+                      <a:schemeClr val="bg1"/>
+                    </a:solidFill>
+                  </a:endParaRPr>
+                </a:p>
+                <a:p>
+                  <a:endParaRPr lang="en-US" dirty="0">
+                    <a:solidFill>
+                      <a:schemeClr val="bg1"/>
+                    </a:solidFill>
+                  </a:endParaRPr>
+                </a:p>
+                <a:p>
+                  <a:endParaRPr lang="en-US" dirty="0">
+                    <a:solidFill>
+                      <a:schemeClr val="bg1"/>
+                    </a:solidFill>
+                  </a:endParaRPr>
+                </a:p>
+                <a:p>
+                  <a:endParaRPr lang="en-US" dirty="0">
+                    <a:solidFill>
+                      <a:schemeClr val="bg1"/>
+                    </a:solidFill>
+                  </a:endParaRPr>
+                </a:p>
+                <a:p>
+                  <a:endParaRPr lang="en-US" dirty="0">
+                    <a:solidFill>
+                      <a:schemeClr val="bg1"/>
+                    </a:solidFill>
+                  </a:endParaRPr>
+                </a:p>
+                <a:p>
+                  <a:endParaRPr lang="en-US" dirty="0">
+                    <a:solidFill>
+                      <a:schemeClr val="bg1"/>
+                    </a:solidFill>
+                  </a:endParaRPr>
+                </a:p>
+                <a:p>
+                  <a:r>
+                    <a:rPr lang="en-US" b="1" dirty="0">
+                      <a:solidFill>
+                        <a:schemeClr val="bg1"/>
+                      </a:solidFill>
+                    </a:rPr>
+                    <a:t>If you play by touch device:</a:t>
+                  </a:r>
+                </a:p>
+                <a:p>
+                  <a:endParaRPr lang="en-US" dirty="0">
+                    <a:solidFill>
+                      <a:schemeClr val="bg1"/>
+                    </a:solidFill>
+                  </a:endParaRPr>
+                </a:p>
+                <a:p>
+                  <a:r>
+                    <a:rPr lang="en-US" dirty="0">
+                      <a:solidFill>
+                        <a:schemeClr val="bg1"/>
+                      </a:solidFill>
+                    </a:rPr>
+                    <a:t>use left hand finger for ship control</a:t>
+                  </a:r>
+                </a:p>
+                <a:p>
+                  <a:r>
+                    <a:rPr lang="en-US" dirty="0">
+                      <a:solidFill>
+                        <a:schemeClr val="bg1"/>
+                      </a:solidFill>
+                    </a:rPr>
+                    <a:t>use right hand finger for shooting</a:t>
+                  </a:r>
+                </a:p>
+              </p:txBody>
+            </p:sp>
+          </mc:Choice>
+          <mc:Fallback>
+            <p:sp>
+              <p:nvSpPr>
+                <p:cNvPr id="12" name="TextBox 11">
+                  <a:extLst>
+                    <a:ext uri="{FF2B5EF4-FFF2-40B4-BE49-F238E27FC236}">
+                      <a16:creationId xmlns:a16="http://schemas.microsoft.com/office/drawing/2014/main" id="{994560BB-64A6-4BDF-483E-3B4BF2D7B02B}"/>
+                    </a:ext>
+                  </a:extLst>
+                </p:cNvPr>
+                <p:cNvSpPr txBox="1">
+                  <a:spLocks noRot="1" noChangeAspect="1" noMove="1" noResize="1" noEditPoints="1" noAdjustHandles="1" noChangeArrowheads="1" noChangeShapeType="1" noTextEdit="1"/>
+                </p:cNvSpPr>
+                <p:nvPr/>
+              </p:nvSpPr>
+              <p:spPr>
+                <a:xfrm>
+                  <a:off x="62959" y="1868592"/>
+                  <a:ext cx="3486275" cy="3970318"/>
+                </a:xfrm>
+                <a:prstGeom prst="rect">
+                  <a:avLst/>
+                </a:prstGeom>
+                <a:blipFill>
+                  <a:blip r:embed="rId3"/>
+                  <a:stretch>
+                    <a:fillRect l="-1220" t="-766" r="-697" b="-1378"/>
+                  </a:stretch>
+                </a:blipFill>
+                <a:ln>
+                  <a:solidFill>
+                    <a:schemeClr val="bg1"/>
+                  </a:solidFill>
+                </a:ln>
+              </p:spPr>
+              <p:txBody>
+                <a:bodyPr/>
+                <a:lstStyle/>
+                <a:p>
+                  <a:r>
+                    <a:rPr lang="en-US">
+                      <a:noFill/>
+                    </a:rPr>
+                    <a:t> </a:t>
+                  </a:r>
+                </a:p>
+              </p:txBody>
+            </p:sp>
+          </mc:Fallback>
+        </mc:AlternateContent>
+        <p:sp>
+          <p:nvSpPr>
+            <p:cNvPr id="13" name="TextBox 12">
+              <a:extLst>
+                <a:ext uri="{FF2B5EF4-FFF2-40B4-BE49-F238E27FC236}">
+                  <a16:creationId xmlns:a16="http://schemas.microsoft.com/office/drawing/2014/main" id="{3B699F56-D8F6-897E-4009-EB42595BE7B8}"/>
+                </a:ext>
+              </a:extLst>
+            </p:cNvPr>
+            <p:cNvSpPr txBox="1"/>
+            <p:nvPr/>
+          </p:nvSpPr>
+          <p:spPr>
+            <a:xfrm>
+              <a:off x="4569500" y="2081137"/>
+              <a:ext cx="1661032" cy="369332"/>
+            </a:xfrm>
+            <a:prstGeom prst="rect">
+              <a:avLst/>
+            </a:prstGeom>
+            <a:noFill/>
+            <a:ln>
+              <a:solidFill>
+                <a:srgbClr val="A9D18E"/>
+              </a:solidFill>
+            </a:ln>
+          </p:spPr>
+          <p:txBody>
+            <a:bodyPr wrap="none" rtlCol="0">
+              <a:spAutoFit/>
+            </a:bodyPr>
+            <a:lstStyle/>
+            <a:p>
+              <a:r>
+                <a:rPr lang="en-US" dirty="0">
+                  <a:solidFill>
+                    <a:srgbClr val="A9D18E"/>
+                  </a:solidFill>
+                </a:rPr>
+                <a:t>Collect bonuses</a:t>
+              </a:r>
+            </a:p>
+          </p:txBody>
+        </p:sp>
+        <p:sp>
+          <p:nvSpPr>
+            <p:cNvPr id="14" name="TextBox 13">
+              <a:extLst>
+                <a:ext uri="{FF2B5EF4-FFF2-40B4-BE49-F238E27FC236}">
+                  <a16:creationId xmlns:a16="http://schemas.microsoft.com/office/drawing/2014/main" id="{0B1F5253-5145-7B8A-EA3F-262698ABCAD7}"/>
+                </a:ext>
+              </a:extLst>
+            </p:cNvPr>
+            <p:cNvSpPr txBox="1"/>
+            <p:nvPr/>
+          </p:nvSpPr>
+          <p:spPr>
+            <a:xfrm>
+              <a:off x="6999274" y="2664858"/>
+              <a:ext cx="2023956" cy="923330"/>
+            </a:xfrm>
+            <a:prstGeom prst="rect">
+              <a:avLst/>
+            </a:prstGeom>
+            <a:noFill/>
+            <a:ln>
+              <a:solidFill>
+                <a:srgbClr val="397F8B"/>
+              </a:solidFill>
+            </a:ln>
+          </p:spPr>
+          <p:txBody>
+            <a:bodyPr wrap="square" rtlCol="0">
+              <a:spAutoFit/>
+            </a:bodyPr>
+            <a:lstStyle/>
+            <a:p>
+              <a:r>
+                <a:rPr lang="en-US" dirty="0">
+                  <a:solidFill>
+                    <a:srgbClr val="397F8B"/>
+                  </a:solidFill>
+                </a:rPr>
+                <a:t>Destroy enemies and don't let them destroy your ally</a:t>
+              </a:r>
+            </a:p>
+          </p:txBody>
+        </p:sp>
+      </p:grpSp>
+    </p:spTree>
+    <p:extLst>
+      <p:ext uri="{BB962C8B-B14F-4D97-AF65-F5344CB8AC3E}">
+        <p14:creationId xmlns:p14="http://schemas.microsoft.com/office/powerpoint/2010/main" val="1953038387"/>
+      </p:ext>
+    </p:extLst>
+  </p:cSld>
+  <p:clrMapOvr>
+    <a:masterClrMapping/>
+  </p:clrMapOvr>
+</p:sld>
+</file>
+
 <file path=ppt/theme/theme1.xml><?xml version="1.0" encoding="utf-8"?>
 <a:theme xmlns:a="http://schemas.openxmlformats.org/drawingml/2006/main" name="Тема Office">
   <a:themeElements>

</xml_diff>